<commit_message>
adding LUV color space in the code and updated report
</commit_message>
<xml_diff>
--- a/high level pipeline flow chart.pptx
+++ b/high level pipeline flow chart.pptx
@@ -104,6 +104,11 @@
       </a:defRPr>
     </a:lvl9pPr>
   </p:defaultTextStyle>
+  <p:extLst>
+    <p:ext uri="{EFAFB233-063F-42B5-8137-9DF3F51BA10A}">
+      <p15:sldGuideLst xmlns:p15="http://schemas.microsoft.com/office/powerpoint/2012/main"/>
+    </p:ext>
+  </p:extLst>
 </p:presentation>
 </file>
 
@@ -254,7 +259,7 @@
           <a:p>
             <a:fld id="{AAEEA38D-2901-4A9E-A88F-9CBE50974EAF}" type="datetimeFigureOut">
               <a:rPr lang="en-US" smtClean="0"/>
-              <a:t>8/10/2019</a:t>
+              <a:t>8/11/2019</a:t>
             </a:fld>
             <a:endParaRPr lang="en-US"/>
           </a:p>
@@ -452,7 +457,7 @@
           <a:p>
             <a:fld id="{AAEEA38D-2901-4A9E-A88F-9CBE50974EAF}" type="datetimeFigureOut">
               <a:rPr lang="en-US" smtClean="0"/>
-              <a:t>8/10/2019</a:t>
+              <a:t>8/11/2019</a:t>
             </a:fld>
             <a:endParaRPr lang="en-US"/>
           </a:p>
@@ -660,7 +665,7 @@
           <a:p>
             <a:fld id="{AAEEA38D-2901-4A9E-A88F-9CBE50974EAF}" type="datetimeFigureOut">
               <a:rPr lang="en-US" smtClean="0"/>
-              <a:t>8/10/2019</a:t>
+              <a:t>8/11/2019</a:t>
             </a:fld>
             <a:endParaRPr lang="en-US"/>
           </a:p>
@@ -858,7 +863,7 @@
           <a:p>
             <a:fld id="{AAEEA38D-2901-4A9E-A88F-9CBE50974EAF}" type="datetimeFigureOut">
               <a:rPr lang="en-US" smtClean="0"/>
-              <a:t>8/10/2019</a:t>
+              <a:t>8/11/2019</a:t>
             </a:fld>
             <a:endParaRPr lang="en-US"/>
           </a:p>
@@ -1133,7 +1138,7 @@
           <a:p>
             <a:fld id="{AAEEA38D-2901-4A9E-A88F-9CBE50974EAF}" type="datetimeFigureOut">
               <a:rPr lang="en-US" smtClean="0"/>
-              <a:t>8/10/2019</a:t>
+              <a:t>8/11/2019</a:t>
             </a:fld>
             <a:endParaRPr lang="en-US"/>
           </a:p>
@@ -1398,7 +1403,7 @@
           <a:p>
             <a:fld id="{AAEEA38D-2901-4A9E-A88F-9CBE50974EAF}" type="datetimeFigureOut">
               <a:rPr lang="en-US" smtClean="0"/>
-              <a:t>8/10/2019</a:t>
+              <a:t>8/11/2019</a:t>
             </a:fld>
             <a:endParaRPr lang="en-US"/>
           </a:p>
@@ -1810,7 +1815,7 @@
           <a:p>
             <a:fld id="{AAEEA38D-2901-4A9E-A88F-9CBE50974EAF}" type="datetimeFigureOut">
               <a:rPr lang="en-US" smtClean="0"/>
-              <a:t>8/10/2019</a:t>
+              <a:t>8/11/2019</a:t>
             </a:fld>
             <a:endParaRPr lang="en-US"/>
           </a:p>
@@ -1951,7 +1956,7 @@
           <a:p>
             <a:fld id="{AAEEA38D-2901-4A9E-A88F-9CBE50974EAF}" type="datetimeFigureOut">
               <a:rPr lang="en-US" smtClean="0"/>
-              <a:t>8/10/2019</a:t>
+              <a:t>8/11/2019</a:t>
             </a:fld>
             <a:endParaRPr lang="en-US"/>
           </a:p>
@@ -2064,7 +2069,7 @@
           <a:p>
             <a:fld id="{AAEEA38D-2901-4A9E-A88F-9CBE50974EAF}" type="datetimeFigureOut">
               <a:rPr lang="en-US" smtClean="0"/>
-              <a:t>8/10/2019</a:t>
+              <a:t>8/11/2019</a:t>
             </a:fld>
             <a:endParaRPr lang="en-US"/>
           </a:p>
@@ -2375,7 +2380,7 @@
           <a:p>
             <a:fld id="{AAEEA38D-2901-4A9E-A88F-9CBE50974EAF}" type="datetimeFigureOut">
               <a:rPr lang="en-US" smtClean="0"/>
-              <a:t>8/10/2019</a:t>
+              <a:t>8/11/2019</a:t>
             </a:fld>
             <a:endParaRPr lang="en-US"/>
           </a:p>
@@ -2663,7 +2668,7 @@
           <a:p>
             <a:fld id="{AAEEA38D-2901-4A9E-A88F-9CBE50974EAF}" type="datetimeFigureOut">
               <a:rPr lang="en-US" smtClean="0"/>
-              <a:t>8/10/2019</a:t>
+              <a:t>8/11/2019</a:t>
             </a:fld>
             <a:endParaRPr lang="en-US"/>
           </a:p>
@@ -2904,7 +2909,7 @@
           <a:p>
             <a:fld id="{AAEEA38D-2901-4A9E-A88F-9CBE50974EAF}" type="datetimeFigureOut">
               <a:rPr lang="en-US" smtClean="0"/>
-              <a:t>8/10/2019</a:t>
+              <a:t>8/11/2019</a:t>
             </a:fld>
             <a:endParaRPr lang="en-US"/>
           </a:p>
@@ -3699,8 +3704,8 @@
         </p:nvSpPr>
         <p:spPr>
           <a:xfrm>
-            <a:off x="3427534" y="3716220"/>
-            <a:ext cx="4633546" cy="351692"/>
+            <a:off x="2092752" y="3716220"/>
+            <a:ext cx="7296346" cy="351692"/>
           </a:xfrm>
           <a:prstGeom prst="rect">
             <a:avLst/>
@@ -3729,7 +3734,7 @@
             <a:pPr algn="ctr"/>
             <a:r>
               <a:rPr lang="nl-NL" dirty="0" err="1"/>
-              <a:t>Define</a:t>
+              <a:t>Apply</a:t>
             </a:r>
             <a:r>
               <a:rPr lang="nl-NL" dirty="0"/>
@@ -3742,6 +3747,38 @@
             <a:r>
               <a:rPr lang="nl-NL" dirty="0"/>
               <a:t> of S Channel in HLS </a:t>
+            </a:r>
+            <a:r>
+              <a:rPr lang="nl-NL" dirty="0" err="1"/>
+              <a:t>space</a:t>
+            </a:r>
+            <a:r>
+              <a:rPr lang="nl-NL" dirty="0"/>
+              <a:t> </a:t>
+            </a:r>
+            <a:r>
+              <a:rPr lang="nl-NL" dirty="0" err="1"/>
+              <a:t>and</a:t>
+            </a:r>
+            <a:r>
+              <a:rPr lang="nl-NL" dirty="0"/>
+              <a:t> L </a:t>
+            </a:r>
+            <a:r>
+              <a:rPr lang="nl-NL" dirty="0" err="1"/>
+              <a:t>channel</a:t>
+            </a:r>
+            <a:r>
+              <a:rPr lang="nl-NL" dirty="0"/>
+              <a:t> in LUV </a:t>
+            </a:r>
+            <a:r>
+              <a:rPr lang="nl-NL" dirty="0" err="1"/>
+              <a:t>color</a:t>
+            </a:r>
+            <a:r>
+              <a:rPr lang="nl-NL" dirty="0"/>
+              <a:t> </a:t>
             </a:r>
             <a:r>
               <a:rPr lang="nl-NL" dirty="0" err="1"/>
@@ -4399,15 +4436,16 @@
             </a:extLst>
           </p:cNvPr>
           <p:cNvCxnSpPr>
+            <a:cxnSpLocks/>
             <a:stCxn id="11" idx="2"/>
             <a:endCxn id="12" idx="0"/>
           </p:cNvCxnSpPr>
           <p:nvPr/>
         </p:nvCxnSpPr>
         <p:spPr>
-          <a:xfrm>
-            <a:off x="5744307" y="3443658"/>
-            <a:ext cx="0" cy="272562"/>
+          <a:xfrm flipH="1">
+            <a:off x="5740925" y="3443658"/>
+            <a:ext cx="3382" cy="272562"/>
           </a:xfrm>
           <a:prstGeom prst="straightConnector1">
             <a:avLst/>
@@ -4441,6 +4479,7 @@
             </a:extLst>
           </p:cNvPr>
           <p:cNvCxnSpPr>
+            <a:cxnSpLocks/>
             <a:stCxn id="12" idx="2"/>
             <a:endCxn id="13" idx="0"/>
           </p:cNvCxnSpPr>
@@ -4448,8 +4487,8 @@
         </p:nvCxnSpPr>
         <p:spPr>
           <a:xfrm>
-            <a:off x="5744307" y="4067912"/>
-            <a:ext cx="0" cy="260844"/>
+            <a:off x="5740925" y="4067912"/>
+            <a:ext cx="3382" cy="260844"/>
           </a:xfrm>
           <a:prstGeom prst="straightConnector1">
             <a:avLst/>

</xml_diff>